<commit_message>
Update Lets Start with Tribal Nations Split.
Also add Erik Porse / UCANR; Add key ideas to ReadMe-Directions worksheet in Excel File
</commit_message>
<xml_diff>
--- a/LakeMeadWaterBankDivideInflow/ImmersiveModelLakeMeadDivideInflow-LetsStart.pptx
+++ b/LakeMeadWaterBankDivideInflow/ImmersiveModelLakeMeadDivideInflow-LetsStart.pptx
@@ -9,7 +9,8 @@
     <p:sldId id="267" r:id="rId3"/>
     <p:sldId id="268" r:id="rId4"/>
     <p:sldId id="259" r:id="rId5"/>
-    <p:sldId id="261" r:id="rId6"/>
+    <p:sldId id="269" r:id="rId6"/>
+    <p:sldId id="261" r:id="rId7"/>
   </p:sldIdLst>
   <p:sldSz cx="12192000" cy="6858000"/>
   <p:notesSz cx="6858000" cy="9144000"/>
@@ -263,7 +264,7 @@
           <a:p>
             <a:fld id="{80695A85-0000-41C1-B1AB-596518EE5666}" type="datetimeFigureOut">
               <a:rPr lang="en-US" smtClean="0"/>
-              <a:t>1/9/2025</a:t>
+              <a:t>1/21/2025</a:t>
             </a:fld>
             <a:endParaRPr lang="en-US"/>
           </a:p>
@@ -461,7 +462,7 @@
           <a:p>
             <a:fld id="{80695A85-0000-41C1-B1AB-596518EE5666}" type="datetimeFigureOut">
               <a:rPr lang="en-US" smtClean="0"/>
-              <a:t>1/9/2025</a:t>
+              <a:t>1/21/2025</a:t>
             </a:fld>
             <a:endParaRPr lang="en-US"/>
           </a:p>
@@ -669,7 +670,7 @@
           <a:p>
             <a:fld id="{80695A85-0000-41C1-B1AB-596518EE5666}" type="datetimeFigureOut">
               <a:rPr lang="en-US" smtClean="0"/>
-              <a:t>1/9/2025</a:t>
+              <a:t>1/21/2025</a:t>
             </a:fld>
             <a:endParaRPr lang="en-US"/>
           </a:p>
@@ -867,7 +868,7 @@
           <a:p>
             <a:fld id="{80695A85-0000-41C1-B1AB-596518EE5666}" type="datetimeFigureOut">
               <a:rPr lang="en-US" smtClean="0"/>
-              <a:t>1/9/2025</a:t>
+              <a:t>1/21/2025</a:t>
             </a:fld>
             <a:endParaRPr lang="en-US"/>
           </a:p>
@@ -1142,7 +1143,7 @@
           <a:p>
             <a:fld id="{80695A85-0000-41C1-B1AB-596518EE5666}" type="datetimeFigureOut">
               <a:rPr lang="en-US" smtClean="0"/>
-              <a:t>1/9/2025</a:t>
+              <a:t>1/21/2025</a:t>
             </a:fld>
             <a:endParaRPr lang="en-US"/>
           </a:p>
@@ -1407,7 +1408,7 @@
           <a:p>
             <a:fld id="{80695A85-0000-41C1-B1AB-596518EE5666}" type="datetimeFigureOut">
               <a:rPr lang="en-US" smtClean="0"/>
-              <a:t>1/9/2025</a:t>
+              <a:t>1/21/2025</a:t>
             </a:fld>
             <a:endParaRPr lang="en-US"/>
           </a:p>
@@ -1819,7 +1820,7 @@
           <a:p>
             <a:fld id="{80695A85-0000-41C1-B1AB-596518EE5666}" type="datetimeFigureOut">
               <a:rPr lang="en-US" smtClean="0"/>
-              <a:t>1/9/2025</a:t>
+              <a:t>1/21/2025</a:t>
             </a:fld>
             <a:endParaRPr lang="en-US"/>
           </a:p>
@@ -1960,7 +1961,7 @@
           <a:p>
             <a:fld id="{80695A85-0000-41C1-B1AB-596518EE5666}" type="datetimeFigureOut">
               <a:rPr lang="en-US" smtClean="0"/>
-              <a:t>1/9/2025</a:t>
+              <a:t>1/21/2025</a:t>
             </a:fld>
             <a:endParaRPr lang="en-US"/>
           </a:p>
@@ -2073,7 +2074,7 @@
           <a:p>
             <a:fld id="{80695A85-0000-41C1-B1AB-596518EE5666}" type="datetimeFigureOut">
               <a:rPr lang="en-US" smtClean="0"/>
-              <a:t>1/9/2025</a:t>
+              <a:t>1/21/2025</a:t>
             </a:fld>
             <a:endParaRPr lang="en-US"/>
           </a:p>
@@ -2384,7 +2385,7 @@
           <a:p>
             <a:fld id="{80695A85-0000-41C1-B1AB-596518EE5666}" type="datetimeFigureOut">
               <a:rPr lang="en-US" smtClean="0"/>
-              <a:t>1/9/2025</a:t>
+              <a:t>1/21/2025</a:t>
             </a:fld>
             <a:endParaRPr lang="en-US"/>
           </a:p>
@@ -2672,7 +2673,7 @@
           <a:p>
             <a:fld id="{80695A85-0000-41C1-B1AB-596518EE5666}" type="datetimeFigureOut">
               <a:rPr lang="en-US" smtClean="0"/>
-              <a:t>1/9/2025</a:t>
+              <a:t>1/21/2025</a:t>
             </a:fld>
             <a:endParaRPr lang="en-US"/>
           </a:p>
@@ -2913,7 +2914,7 @@
           <a:p>
             <a:fld id="{80695A85-0000-41C1-B1AB-596518EE5666}" type="datetimeFigureOut">
               <a:rPr lang="en-US" smtClean="0"/>
-              <a:t>1/9/2025</a:t>
+              <a:t>1/21/2025</a:t>
             </a:fld>
             <a:endParaRPr lang="en-US"/>
           </a:p>
@@ -3446,7 +3447,7 @@
         </p:nvSpPr>
         <p:spPr>
           <a:xfrm>
-            <a:off x="8941654" y="4839120"/>
+            <a:off x="8932690" y="4591073"/>
             <a:ext cx="2904227" cy="1655762"/>
           </a:xfrm>
         </p:spPr>
@@ -3462,23 +3463,6 @@
               </a:rPr>
               <a:t>David E. Rosenberg</a:t>
             </a:r>
-          </a:p>
-          <a:p>
-            <a:r>
-              <a:rPr lang="en-US" sz="1600" dirty="0">
-                <a:latin typeface="Comic Sans MS" panose="030F0702030302020204" pitchFamily="66" charset="0"/>
-              </a:rPr>
-              <a:t>@</a:t>
-            </a:r>
-            <a:r>
-              <a:rPr lang="en-US" sz="1600" dirty="0" err="1">
-                <a:latin typeface="Comic Sans MS" panose="030F0702030302020204" pitchFamily="66" charset="0"/>
-              </a:rPr>
-              <a:t>WaterModeler</a:t>
-            </a:r>
-            <a:endParaRPr lang="en-US" sz="1600" dirty="0">
-              <a:latin typeface="Comic Sans MS" panose="030F0702030302020204" pitchFamily="66" charset="0"/>
-            </a:endParaRPr>
           </a:p>
           <a:p>
             <a:r>
@@ -3506,6 +3490,26 @@
               </a:rPr>
               <a:t> </a:t>
             </a:r>
+          </a:p>
+          <a:p>
+            <a:r>
+              <a:rPr lang="en-US" sz="1600" b="1" dirty="0">
+                <a:latin typeface="Comic Sans MS" panose="030F0702030302020204" pitchFamily="66" charset="0"/>
+              </a:rPr>
+              <a:t>Erik Porse</a:t>
+            </a:r>
+          </a:p>
+          <a:p>
+            <a:r>
+              <a:rPr lang="en-US" sz="1600" dirty="0">
+                <a:latin typeface="Comic Sans MS" panose="030F0702030302020204" pitchFamily="66" charset="0"/>
+                <a:hlinkClick r:id="rId4"/>
+              </a:rPr>
+              <a:t>https://ucanr.edu</a:t>
+            </a:r>
+            <a:endParaRPr lang="en-US" sz="1600" dirty="0">
+              <a:latin typeface="Comic Sans MS" panose="030F0702030302020204" pitchFamily="66" charset="0"/>
+            </a:endParaRPr>
           </a:p>
           <a:p>
             <a:r>
@@ -3532,14 +3536,14 @@
           <p:nvPr/>
         </p:nvPicPr>
         <p:blipFill>
-          <a:blip r:embed="rId4"/>
+          <a:blip r:embed="rId5"/>
           <a:stretch>
             <a:fillRect/>
           </a:stretch>
         </p:blipFill>
         <p:spPr>
           <a:xfrm>
-            <a:off x="241698" y="5420208"/>
+            <a:off x="811306" y="4591073"/>
             <a:ext cx="1940785" cy="1231917"/>
           </a:xfrm>
           <a:prstGeom prst="rect">
@@ -3550,6 +3554,36 @@
               <a:schemeClr val="tx1"/>
             </a:solidFill>
           </a:ln>
+        </p:spPr>
+      </p:pic>
+      <p:pic>
+        <p:nvPicPr>
+          <p:cNvPr id="9" name="Picture 8">
+            <a:extLst>
+              <a:ext uri="{FF2B5EF4-FFF2-40B4-BE49-F238E27FC236}">
+                <a16:creationId xmlns:a16="http://schemas.microsoft.com/office/drawing/2014/main" id="{0F46F789-85C3-1ABF-7D1C-8269A2D9A913}"/>
+              </a:ext>
+            </a:extLst>
+          </p:cNvPr>
+          <p:cNvPicPr>
+            <a:picLocks noChangeAspect="1"/>
+          </p:cNvPicPr>
+          <p:nvPr/>
+        </p:nvPicPr>
+        <p:blipFill>
+          <a:blip r:embed="rId6"/>
+          <a:stretch>
+            <a:fillRect/>
+          </a:stretch>
+        </p:blipFill>
+        <p:spPr>
+          <a:xfrm>
+            <a:off x="122383" y="5947364"/>
+            <a:ext cx="3318630" cy="547518"/>
+          </a:xfrm>
+          <a:prstGeom prst="rect">
+            <a:avLst/>
+          </a:prstGeom>
         </p:spPr>
       </p:pic>
     </p:spTree>
@@ -5008,7 +5042,7 @@
                 </a:solidFill>
                 <a:latin typeface="Comic Sans MS" panose="030F0702030302020204" pitchFamily="66" charset="0"/>
               </a:rPr>
-              <a:t>Lake Mead water Level is the sum of the protection elevation and each user’s available water</a:t>
+              <a:t>1. Lake Mead water level is the sum of the protection elevation and each user’s available water</a:t>
             </a:r>
           </a:p>
         </p:txBody>
@@ -5837,7 +5871,7 @@
                 </a:solidFill>
                 <a:latin typeface="Comic Sans MS" panose="030F0702030302020204" pitchFamily="66" charset="0"/>
               </a:rPr>
-              <a:t>Manage all available water not just prior conserved water.</a:t>
+              <a:t>2. Each user manages all their available water not just prior conserved water.</a:t>
             </a:r>
           </a:p>
         </p:txBody>
@@ -6401,6 +6435,493 @@
     </p:bg>
     <p:spTree>
       <p:nvGrpSpPr>
+        <p:cNvPr id="1" name="">
+          <a:extLst>
+            <a:ext uri="{FF2B5EF4-FFF2-40B4-BE49-F238E27FC236}">
+              <a16:creationId xmlns:a16="http://schemas.microsoft.com/office/drawing/2014/main" id="{4194901F-86E8-0048-3AA9-347AD7016EA1}"/>
+            </a:ext>
+          </a:extLst>
+        </p:cNvPr>
+        <p:cNvGrpSpPr/>
+        <p:nvPr/>
+      </p:nvGrpSpPr>
+      <p:grpSpPr>
+        <a:xfrm>
+          <a:off x="0" y="0"/>
+          <a:ext cx="0" cy="0"/>
+          <a:chOff x="0" y="0"/>
+          <a:chExt cx="0" cy="0"/>
+        </a:xfrm>
+      </p:grpSpPr>
+      <p:sp>
+        <p:nvSpPr>
+          <p:cNvPr id="25" name="Rectangle 24">
+            <a:extLst>
+              <a:ext uri="{FF2B5EF4-FFF2-40B4-BE49-F238E27FC236}">
+                <a16:creationId xmlns:a16="http://schemas.microsoft.com/office/drawing/2014/main" id="{CEE6A100-6190-03C1-4AC1-ED5A1D140247}"/>
+              </a:ext>
+            </a:extLst>
+          </p:cNvPr>
+          <p:cNvSpPr/>
+          <p:nvPr/>
+        </p:nvSpPr>
+        <p:spPr>
+          <a:xfrm>
+            <a:off x="6315959" y="2814919"/>
+            <a:ext cx="3157979" cy="2671482"/>
+          </a:xfrm>
+          <a:prstGeom prst="rect">
+            <a:avLst/>
+          </a:prstGeom>
+          <a:solidFill>
+            <a:schemeClr val="accent2">
+              <a:lumMod val="20000"/>
+              <a:lumOff val="80000"/>
+            </a:schemeClr>
+          </a:solidFill>
+          <a:ln w="22225"/>
+        </p:spPr>
+        <p:style>
+          <a:lnRef idx="2">
+            <a:schemeClr val="accent1">
+              <a:shade val="15000"/>
+            </a:schemeClr>
+          </a:lnRef>
+          <a:fillRef idx="1">
+            <a:schemeClr val="accent1"/>
+          </a:fillRef>
+          <a:effectRef idx="0">
+            <a:schemeClr val="accent1"/>
+          </a:effectRef>
+          <a:fontRef idx="minor">
+            <a:schemeClr val="lt1"/>
+          </a:fontRef>
+        </p:style>
+        <p:txBody>
+          <a:bodyPr rtlCol="0" anchor="ctr"/>
+          <a:lstStyle/>
+          <a:p>
+            <a:pPr algn="ctr"/>
+            <a:endParaRPr lang="en-US"/>
+          </a:p>
+        </p:txBody>
+      </p:sp>
+      <p:sp>
+        <p:nvSpPr>
+          <p:cNvPr id="24" name="Rectangle 23">
+            <a:extLst>
+              <a:ext uri="{FF2B5EF4-FFF2-40B4-BE49-F238E27FC236}">
+                <a16:creationId xmlns:a16="http://schemas.microsoft.com/office/drawing/2014/main" id="{B81EF1D2-DBA4-B3E4-9395-7DF576A60114}"/>
+              </a:ext>
+            </a:extLst>
+          </p:cNvPr>
+          <p:cNvSpPr/>
+          <p:nvPr/>
+        </p:nvSpPr>
+        <p:spPr>
+          <a:xfrm>
+            <a:off x="2300140" y="2814919"/>
+            <a:ext cx="4015819" cy="2671482"/>
+          </a:xfrm>
+          <a:prstGeom prst="rect">
+            <a:avLst/>
+          </a:prstGeom>
+          <a:solidFill>
+            <a:schemeClr val="accent1">
+              <a:lumMod val="20000"/>
+              <a:lumOff val="80000"/>
+            </a:schemeClr>
+          </a:solidFill>
+          <a:ln w="22225"/>
+        </p:spPr>
+        <p:style>
+          <a:lnRef idx="2">
+            <a:schemeClr val="accent1">
+              <a:shade val="15000"/>
+            </a:schemeClr>
+          </a:lnRef>
+          <a:fillRef idx="1">
+            <a:schemeClr val="accent1"/>
+          </a:fillRef>
+          <a:effectRef idx="0">
+            <a:schemeClr val="accent1"/>
+          </a:effectRef>
+          <a:fontRef idx="minor">
+            <a:schemeClr val="lt1"/>
+          </a:fontRef>
+        </p:style>
+        <p:txBody>
+          <a:bodyPr rtlCol="0" anchor="ctr"/>
+          <a:lstStyle/>
+          <a:p>
+            <a:pPr algn="ctr"/>
+            <a:endParaRPr lang="en-US"/>
+          </a:p>
+        </p:txBody>
+      </p:sp>
+      <p:sp>
+        <p:nvSpPr>
+          <p:cNvPr id="13" name="TextBox 12">
+            <a:extLst>
+              <a:ext uri="{FF2B5EF4-FFF2-40B4-BE49-F238E27FC236}">
+                <a16:creationId xmlns:a16="http://schemas.microsoft.com/office/drawing/2014/main" id="{EFC1564A-8B47-E725-642F-A8C20B5567B3}"/>
+              </a:ext>
+            </a:extLst>
+          </p:cNvPr>
+          <p:cNvSpPr txBox="1"/>
+          <p:nvPr/>
+        </p:nvSpPr>
+        <p:spPr>
+          <a:xfrm>
+            <a:off x="539112" y="832965"/>
+            <a:ext cx="10843591" cy="1077218"/>
+          </a:xfrm>
+          <a:prstGeom prst="rect">
+            <a:avLst/>
+          </a:prstGeom>
+          <a:noFill/>
+        </p:spPr>
+        <p:txBody>
+          <a:bodyPr wrap="square" rtlCol="0">
+            <a:spAutoFit/>
+          </a:bodyPr>
+          <a:lstStyle/>
+          <a:p>
+            <a:pPr algn="ctr"/>
+            <a:r>
+              <a:rPr lang="en-US" sz="3200" b="1" dirty="0">
+                <a:solidFill>
+                  <a:srgbClr val="002060"/>
+                </a:solidFill>
+                <a:latin typeface="Comic Sans MS" panose="030F0702030302020204" pitchFamily="66" charset="0"/>
+              </a:rPr>
+              <a:t>3. Tribal Nations of the Lower Basin manage their own settled water rights</a:t>
+            </a:r>
+          </a:p>
+        </p:txBody>
+      </p:sp>
+      <p:sp>
+        <p:nvSpPr>
+          <p:cNvPr id="20" name="TextBox 19">
+            <a:extLst>
+              <a:ext uri="{FF2B5EF4-FFF2-40B4-BE49-F238E27FC236}">
+                <a16:creationId xmlns:a16="http://schemas.microsoft.com/office/drawing/2014/main" id="{D1731D7D-3F58-FB5A-91C0-3A25921955CC}"/>
+              </a:ext>
+            </a:extLst>
+          </p:cNvPr>
+          <p:cNvSpPr txBox="1"/>
+          <p:nvPr/>
+        </p:nvSpPr>
+        <p:spPr>
+          <a:xfrm>
+            <a:off x="2598008" y="3291887"/>
+            <a:ext cx="1842017" cy="584775"/>
+          </a:xfrm>
+          <a:prstGeom prst="rect">
+            <a:avLst/>
+          </a:prstGeom>
+          <a:noFill/>
+        </p:spPr>
+        <p:txBody>
+          <a:bodyPr wrap="square" rtlCol="0">
+            <a:spAutoFit/>
+          </a:bodyPr>
+          <a:lstStyle/>
+          <a:p>
+            <a:r>
+              <a:rPr lang="en-US" sz="3200" b="1" dirty="0">
+                <a:solidFill>
+                  <a:srgbClr val="0000FF"/>
+                </a:solidFill>
+              </a:rPr>
+              <a:t>California</a:t>
+            </a:r>
+          </a:p>
+        </p:txBody>
+      </p:sp>
+      <p:sp>
+        <p:nvSpPr>
+          <p:cNvPr id="21" name="TextBox 20">
+            <a:extLst>
+              <a:ext uri="{FF2B5EF4-FFF2-40B4-BE49-F238E27FC236}">
+                <a16:creationId xmlns:a16="http://schemas.microsoft.com/office/drawing/2014/main" id="{37E74C97-F985-342E-0F88-4241D9663912}"/>
+              </a:ext>
+            </a:extLst>
+          </p:cNvPr>
+          <p:cNvSpPr txBox="1"/>
+          <p:nvPr/>
+        </p:nvSpPr>
+        <p:spPr>
+          <a:xfrm>
+            <a:off x="7763897" y="3291887"/>
+            <a:ext cx="1534840" cy="584775"/>
+          </a:xfrm>
+          <a:prstGeom prst="rect">
+            <a:avLst/>
+          </a:prstGeom>
+          <a:noFill/>
+        </p:spPr>
+        <p:txBody>
+          <a:bodyPr wrap="square" rtlCol="0">
+            <a:spAutoFit/>
+          </a:bodyPr>
+          <a:lstStyle/>
+          <a:p>
+            <a:r>
+              <a:rPr lang="en-US" sz="3200" b="1" dirty="0">
+                <a:solidFill>
+                  <a:schemeClr val="accent2">
+                    <a:lumMod val="50000"/>
+                  </a:schemeClr>
+                </a:solidFill>
+              </a:rPr>
+              <a:t>Arizona</a:t>
+            </a:r>
+          </a:p>
+        </p:txBody>
+      </p:sp>
+      <p:sp>
+        <p:nvSpPr>
+          <p:cNvPr id="26" name="Rectangle 25">
+            <a:extLst>
+              <a:ext uri="{FF2B5EF4-FFF2-40B4-BE49-F238E27FC236}">
+                <a16:creationId xmlns:a16="http://schemas.microsoft.com/office/drawing/2014/main" id="{CD895DFA-21C6-0996-5163-636CFEE077FB}"/>
+              </a:ext>
+            </a:extLst>
+          </p:cNvPr>
+          <p:cNvSpPr/>
+          <p:nvPr/>
+        </p:nvSpPr>
+        <p:spPr>
+          <a:xfrm>
+            <a:off x="5288438" y="2814919"/>
+            <a:ext cx="2300258" cy="2671482"/>
+          </a:xfrm>
+          <a:prstGeom prst="rect">
+            <a:avLst/>
+          </a:prstGeom>
+          <a:solidFill>
+            <a:schemeClr val="accent4">
+              <a:lumMod val="20000"/>
+              <a:lumOff val="80000"/>
+              <a:alpha val="71000"/>
+            </a:schemeClr>
+          </a:solidFill>
+        </p:spPr>
+        <p:style>
+          <a:lnRef idx="2">
+            <a:schemeClr val="accent1">
+              <a:shade val="15000"/>
+            </a:schemeClr>
+          </a:lnRef>
+          <a:fillRef idx="1">
+            <a:schemeClr val="accent1"/>
+          </a:fillRef>
+          <a:effectRef idx="0">
+            <a:schemeClr val="accent1"/>
+          </a:effectRef>
+          <a:fontRef idx="minor">
+            <a:schemeClr val="lt1"/>
+          </a:fontRef>
+        </p:style>
+        <p:txBody>
+          <a:bodyPr rtlCol="0" anchor="ctr"/>
+          <a:lstStyle/>
+          <a:p>
+            <a:pPr algn="ctr"/>
+            <a:endParaRPr lang="en-US">
+              <a:solidFill>
+                <a:srgbClr val="0000FF"/>
+              </a:solidFill>
+            </a:endParaRPr>
+          </a:p>
+        </p:txBody>
+      </p:sp>
+      <p:sp>
+        <p:nvSpPr>
+          <p:cNvPr id="27" name="TextBox 26">
+            <a:extLst>
+              <a:ext uri="{FF2B5EF4-FFF2-40B4-BE49-F238E27FC236}">
+                <a16:creationId xmlns:a16="http://schemas.microsoft.com/office/drawing/2014/main" id="{6092F63F-61AC-3030-4A78-66D8F79A14A3}"/>
+              </a:ext>
+            </a:extLst>
+          </p:cNvPr>
+          <p:cNvSpPr txBox="1"/>
+          <p:nvPr/>
+        </p:nvSpPr>
+        <p:spPr>
+          <a:xfrm>
+            <a:off x="5765413" y="3291887"/>
+            <a:ext cx="1534840" cy="584775"/>
+          </a:xfrm>
+          <a:prstGeom prst="rect">
+            <a:avLst/>
+          </a:prstGeom>
+          <a:noFill/>
+        </p:spPr>
+        <p:txBody>
+          <a:bodyPr wrap="square" rtlCol="0">
+            <a:spAutoFit/>
+          </a:bodyPr>
+          <a:lstStyle/>
+          <a:p>
+            <a:pPr algn="ctr"/>
+            <a:r>
+              <a:rPr lang="en-US" sz="3200" b="1" dirty="0">
+                <a:solidFill>
+                  <a:schemeClr val="accent6">
+                    <a:lumMod val="50000"/>
+                  </a:schemeClr>
+                </a:solidFill>
+              </a:rPr>
+              <a:t>Tribal</a:t>
+            </a:r>
+          </a:p>
+        </p:txBody>
+      </p:sp>
+      <p:sp>
+        <p:nvSpPr>
+          <p:cNvPr id="23" name="TextBox 22">
+            <a:extLst>
+              <a:ext uri="{FF2B5EF4-FFF2-40B4-BE49-F238E27FC236}">
+                <a16:creationId xmlns:a16="http://schemas.microsoft.com/office/drawing/2014/main" id="{EBC00D3C-316D-7ED3-E867-882F5AAB14A1}"/>
+              </a:ext>
+            </a:extLst>
+          </p:cNvPr>
+          <p:cNvSpPr txBox="1"/>
+          <p:nvPr/>
+        </p:nvSpPr>
+        <p:spPr>
+          <a:xfrm>
+            <a:off x="5227340" y="4022872"/>
+            <a:ext cx="1211227" cy="523220"/>
+          </a:xfrm>
+          <a:prstGeom prst="rect">
+            <a:avLst/>
+          </a:prstGeom>
+          <a:noFill/>
+        </p:spPr>
+        <p:txBody>
+          <a:bodyPr wrap="square" rtlCol="0">
+            <a:spAutoFit/>
+          </a:bodyPr>
+          <a:lstStyle/>
+          <a:p>
+            <a:pPr algn="ctr"/>
+            <a:r>
+              <a:rPr lang="en-US" sz="2800" b="1" dirty="0">
+                <a:solidFill>
+                  <a:srgbClr val="0000FF"/>
+                </a:solidFill>
+              </a:rPr>
+              <a:t>16.4%</a:t>
+            </a:r>
+          </a:p>
+        </p:txBody>
+      </p:sp>
+      <p:sp>
+        <p:nvSpPr>
+          <p:cNvPr id="28" name="TextBox 27">
+            <a:extLst>
+              <a:ext uri="{FF2B5EF4-FFF2-40B4-BE49-F238E27FC236}">
+                <a16:creationId xmlns:a16="http://schemas.microsoft.com/office/drawing/2014/main" id="{70B59576-EE7F-DEC7-68DD-9E116EBE5C35}"/>
+              </a:ext>
+            </a:extLst>
+          </p:cNvPr>
+          <p:cNvSpPr txBox="1"/>
+          <p:nvPr/>
+        </p:nvSpPr>
+        <p:spPr>
+          <a:xfrm>
+            <a:off x="6365568" y="4430692"/>
+            <a:ext cx="1211227" cy="523220"/>
+          </a:xfrm>
+          <a:prstGeom prst="rect">
+            <a:avLst/>
+          </a:prstGeom>
+          <a:noFill/>
+        </p:spPr>
+        <p:txBody>
+          <a:bodyPr wrap="square" rtlCol="0">
+            <a:spAutoFit/>
+          </a:bodyPr>
+          <a:lstStyle/>
+          <a:p>
+            <a:pPr algn="ctr"/>
+            <a:r>
+              <a:rPr lang="en-US" sz="2800" b="1" dirty="0">
+                <a:solidFill>
+                  <a:schemeClr val="accent2">
+                    <a:lumMod val="50000"/>
+                  </a:schemeClr>
+                </a:solidFill>
+              </a:rPr>
+              <a:t>82.4%</a:t>
+            </a:r>
+          </a:p>
+        </p:txBody>
+      </p:sp>
+      <p:sp>
+        <p:nvSpPr>
+          <p:cNvPr id="29" name="TextBox 28">
+            <a:extLst>
+              <a:ext uri="{FF2B5EF4-FFF2-40B4-BE49-F238E27FC236}">
+                <a16:creationId xmlns:a16="http://schemas.microsoft.com/office/drawing/2014/main" id="{BB28218A-51FE-9E67-6B62-54D8E034A52D}"/>
+              </a:ext>
+            </a:extLst>
+          </p:cNvPr>
+          <p:cNvSpPr txBox="1"/>
+          <p:nvPr/>
+        </p:nvSpPr>
+        <p:spPr>
+          <a:xfrm>
+            <a:off x="4635860" y="5748042"/>
+            <a:ext cx="3056411" cy="584775"/>
+          </a:xfrm>
+          <a:prstGeom prst="rect">
+            <a:avLst/>
+          </a:prstGeom>
+          <a:noFill/>
+        </p:spPr>
+        <p:txBody>
+          <a:bodyPr wrap="square" rtlCol="0">
+            <a:spAutoFit/>
+          </a:bodyPr>
+          <a:lstStyle/>
+          <a:p>
+            <a:r>
+              <a:rPr lang="en-US" sz="3200" b="1" dirty="0"/>
+              <a:t>(Ignore Nevada)</a:t>
+            </a:r>
+          </a:p>
+        </p:txBody>
+      </p:sp>
+    </p:spTree>
+    <p:extLst>
+      <p:ext uri="{BB962C8B-B14F-4D97-AF65-F5344CB8AC3E}">
+        <p14:creationId xmlns:p14="http://schemas.microsoft.com/office/powerpoint/2010/main" val="3534922952"/>
+      </p:ext>
+    </p:extLst>
+  </p:cSld>
+  <p:clrMapOvr>
+    <a:masterClrMapping/>
+  </p:clrMapOvr>
+</p:sld>
+</file>
+
+<file path=ppt/slides/slide6.xml><?xml version="1.0" encoding="utf-8"?>
+<p:sld xmlns:a="http://schemas.openxmlformats.org/drawingml/2006/main" xmlns:r="http://schemas.openxmlformats.org/officeDocument/2006/relationships" xmlns:p="http://schemas.openxmlformats.org/presentationml/2006/main">
+  <p:cSld>
+    <p:bg>
+      <p:bgPr>
+        <a:solidFill>
+          <a:srgbClr val="FEFAF8"/>
+        </a:solidFill>
+        <a:effectLst/>
+      </p:bgPr>
+    </p:bg>
+    <p:spTree>
+      <p:nvGrpSpPr>
         <p:cNvPr id="1" name=""/>
         <p:cNvGrpSpPr/>
         <p:nvPr/>
@@ -6697,8 +7218,8 @@
         </p:nvSpPr>
         <p:spPr>
           <a:xfrm>
-            <a:off x="2609528" y="1568094"/>
-            <a:ext cx="4180396" cy="523220"/>
+            <a:off x="2609527" y="1568094"/>
+            <a:ext cx="4790513" cy="523220"/>
           </a:xfrm>
           <a:prstGeom prst="rect">
             <a:avLst/>
@@ -6717,7 +7238,7 @@
                 </a:solidFill>
                 <a:latin typeface="Comic Sans MS" panose="030F0702030302020204" pitchFamily="66" charset="0"/>
               </a:rPr>
-              <a:t>1. Identify guide</a:t>
+              <a:t>1. Identify session guide</a:t>
             </a:r>
           </a:p>
         </p:txBody>

</xml_diff>

<commit_message>
Update purpose in user guide and let's start. Change account balance to prior available water.
</commit_message>
<xml_diff>
--- a/LakeMeadWaterBankDivideInflow/ImmersiveModelLakeMeadDivideInflow-LetsStart.pptx
+++ b/LakeMeadWaterBankDivideInflow/ImmersiveModelLakeMeadDivideInflow-LetsStart.pptx
@@ -264,7 +264,7 @@
           <a:p>
             <a:fld id="{80695A85-0000-41C1-B1AB-596518EE5666}" type="datetimeFigureOut">
               <a:rPr lang="en-US" smtClean="0"/>
-              <a:t>1/21/2025</a:t>
+              <a:t>1/24/2025</a:t>
             </a:fld>
             <a:endParaRPr lang="en-US"/>
           </a:p>
@@ -462,7 +462,7 @@
           <a:p>
             <a:fld id="{80695A85-0000-41C1-B1AB-596518EE5666}" type="datetimeFigureOut">
               <a:rPr lang="en-US" smtClean="0"/>
-              <a:t>1/21/2025</a:t>
+              <a:t>1/24/2025</a:t>
             </a:fld>
             <a:endParaRPr lang="en-US"/>
           </a:p>
@@ -670,7 +670,7 @@
           <a:p>
             <a:fld id="{80695A85-0000-41C1-B1AB-596518EE5666}" type="datetimeFigureOut">
               <a:rPr lang="en-US" smtClean="0"/>
-              <a:t>1/21/2025</a:t>
+              <a:t>1/24/2025</a:t>
             </a:fld>
             <a:endParaRPr lang="en-US"/>
           </a:p>
@@ -868,7 +868,7 @@
           <a:p>
             <a:fld id="{80695A85-0000-41C1-B1AB-596518EE5666}" type="datetimeFigureOut">
               <a:rPr lang="en-US" smtClean="0"/>
-              <a:t>1/21/2025</a:t>
+              <a:t>1/24/2025</a:t>
             </a:fld>
             <a:endParaRPr lang="en-US"/>
           </a:p>
@@ -1143,7 +1143,7 @@
           <a:p>
             <a:fld id="{80695A85-0000-41C1-B1AB-596518EE5666}" type="datetimeFigureOut">
               <a:rPr lang="en-US" smtClean="0"/>
-              <a:t>1/21/2025</a:t>
+              <a:t>1/24/2025</a:t>
             </a:fld>
             <a:endParaRPr lang="en-US"/>
           </a:p>
@@ -1408,7 +1408,7 @@
           <a:p>
             <a:fld id="{80695A85-0000-41C1-B1AB-596518EE5666}" type="datetimeFigureOut">
               <a:rPr lang="en-US" smtClean="0"/>
-              <a:t>1/21/2025</a:t>
+              <a:t>1/24/2025</a:t>
             </a:fld>
             <a:endParaRPr lang="en-US"/>
           </a:p>
@@ -1820,7 +1820,7 @@
           <a:p>
             <a:fld id="{80695A85-0000-41C1-B1AB-596518EE5666}" type="datetimeFigureOut">
               <a:rPr lang="en-US" smtClean="0"/>
-              <a:t>1/21/2025</a:t>
+              <a:t>1/24/2025</a:t>
             </a:fld>
             <a:endParaRPr lang="en-US"/>
           </a:p>
@@ -1961,7 +1961,7 @@
           <a:p>
             <a:fld id="{80695A85-0000-41C1-B1AB-596518EE5666}" type="datetimeFigureOut">
               <a:rPr lang="en-US" smtClean="0"/>
-              <a:t>1/21/2025</a:t>
+              <a:t>1/24/2025</a:t>
             </a:fld>
             <a:endParaRPr lang="en-US"/>
           </a:p>
@@ -2074,7 +2074,7 @@
           <a:p>
             <a:fld id="{80695A85-0000-41C1-B1AB-596518EE5666}" type="datetimeFigureOut">
               <a:rPr lang="en-US" smtClean="0"/>
-              <a:t>1/21/2025</a:t>
+              <a:t>1/24/2025</a:t>
             </a:fld>
             <a:endParaRPr lang="en-US"/>
           </a:p>
@@ -2385,7 +2385,7 @@
           <a:p>
             <a:fld id="{80695A85-0000-41C1-B1AB-596518EE5666}" type="datetimeFigureOut">
               <a:rPr lang="en-US" smtClean="0"/>
-              <a:t>1/21/2025</a:t>
+              <a:t>1/24/2025</a:t>
             </a:fld>
             <a:endParaRPr lang="en-US"/>
           </a:p>
@@ -2673,7 +2673,7 @@
           <a:p>
             <a:fld id="{80695A85-0000-41C1-B1AB-596518EE5666}" type="datetimeFigureOut">
               <a:rPr lang="en-US" smtClean="0"/>
-              <a:t>1/21/2025</a:t>
+              <a:t>1/24/2025</a:t>
             </a:fld>
             <a:endParaRPr lang="en-US"/>
           </a:p>
@@ -2914,7 +2914,7 @@
           <a:p>
             <a:fld id="{80695A85-0000-41C1-B1AB-596518EE5666}" type="datetimeFigureOut">
               <a:rPr lang="en-US" smtClean="0"/>
-              <a:t>1/21/2025</a:t>
+              <a:t>1/24/2025</a:t>
             </a:fld>
             <a:endParaRPr lang="en-US"/>
           </a:p>
@@ -3635,7 +3635,7 @@
         <p:spPr>
           <a:xfrm>
             <a:off x="696976" y="421523"/>
-            <a:ext cx="10631424" cy="1325563"/>
+            <a:ext cx="2259058" cy="1325563"/>
           </a:xfrm>
         </p:spPr>
         <p:txBody>
@@ -3647,7 +3647,7 @@
               <a:rPr lang="en-US" b="1" dirty="0">
                 <a:latin typeface="Comic Sans MS" panose="030F0702030302020204" pitchFamily="66" charset="0"/>
               </a:rPr>
-              <a:t>Today’s Aims</a:t>
+              <a:t>Purpose</a:t>
             </a:r>
           </a:p>
         </p:txBody>
@@ -3666,8 +3666,8 @@
         </p:nvSpPr>
         <p:spPr>
           <a:xfrm>
-            <a:off x="863600" y="1852094"/>
-            <a:ext cx="10464800" cy="3231654"/>
+            <a:off x="3497975" y="2421331"/>
+            <a:ext cx="6960476" cy="2308324"/>
           </a:xfrm>
           <a:prstGeom prst="rect">
             <a:avLst/>
@@ -3679,80 +3679,101 @@
           </a:bodyPr>
           <a:lstStyle/>
           <a:p>
-            <a:pPr algn="ctr"/>
-            <a:r>
-              <a:rPr lang="en-US" sz="2800" b="1" dirty="0">
+            <a:pPr marL="228600" indent="-228600">
+              <a:buFont typeface="Arial" panose="020B0604020202020204" pitchFamily="34" charset="0"/>
+              <a:buChar char="•"/>
+            </a:pPr>
+            <a:r>
+              <a:rPr lang="en-US" sz="2400" dirty="0">
                 <a:solidFill>
-                  <a:srgbClr val="0000FF"/>
+                  <a:srgbClr val="7030A0"/>
                 </a:solidFill>
                 <a:latin typeface="Comic Sans MS" panose="030F0702030302020204" pitchFamily="66" charset="0"/>
               </a:rPr>
-              <a:t>Immerse in and personify water user roles. Decide to withdraw and conserve:</a:t>
-            </a:r>
-          </a:p>
-          <a:p>
-            <a:pPr algn="ctr"/>
-            <a:endParaRPr lang="en-US" sz="2800" b="1" dirty="0">
+              <a:t>Basin partners choose assumptions.</a:t>
+            </a:r>
+          </a:p>
+          <a:p>
+            <a:pPr marL="228600" indent="-228600">
+              <a:buFont typeface="Arial" panose="020B0604020202020204" pitchFamily="34" charset="0"/>
+              <a:buChar char="•"/>
+            </a:pPr>
+            <a:r>
+              <a:rPr lang="en-US" sz="2400" dirty="0">
+                <a:solidFill>
+                  <a:srgbClr val="7030A0"/>
+                </a:solidFill>
+                <a:latin typeface="Comic Sans MS" panose="030F0702030302020204" pitchFamily="66" charset="0"/>
+              </a:rPr>
+              <a:t>Articulate strategies to mange risk.</a:t>
+            </a:r>
+          </a:p>
+          <a:p>
+            <a:pPr marL="228600" indent="-228600">
+              <a:buFont typeface="Arial" panose="020B0604020202020204" pitchFamily="34" charset="0"/>
+              <a:buChar char="•"/>
+            </a:pPr>
+            <a:r>
+              <a:rPr lang="en-US" sz="2400" dirty="0">
+                <a:solidFill>
+                  <a:srgbClr val="7030A0"/>
+                </a:solidFill>
+                <a:latin typeface="Comic Sans MS" panose="030F0702030302020204" pitchFamily="66" charset="0"/>
+              </a:rPr>
+              <a:t>Modify strategies in response to their:</a:t>
+            </a:r>
+          </a:p>
+          <a:p>
+            <a:pPr marL="685800" lvl="1" indent="-228600">
+              <a:buFont typeface="Arial" panose="020B0604020202020204" pitchFamily="34" charset="0"/>
+              <a:buChar char="•"/>
+            </a:pPr>
+            <a:r>
+              <a:rPr lang="en-US" sz="2400" dirty="0">
+                <a:solidFill>
+                  <a:srgbClr val="7030A0"/>
+                </a:solidFill>
+                <a:latin typeface="Comic Sans MS" panose="030F0702030302020204" pitchFamily="66" charset="0"/>
+              </a:rPr>
+              <a:t>Available water.</a:t>
+            </a:r>
+          </a:p>
+          <a:p>
+            <a:pPr marL="685800" lvl="1" indent="-228600">
+              <a:buFont typeface="Arial" panose="020B0604020202020204" pitchFamily="34" charset="0"/>
+              <a:buChar char="•"/>
+            </a:pPr>
+            <a:r>
+              <a:rPr lang="en-US" sz="2400" dirty="0">
+                <a:solidFill>
+                  <a:srgbClr val="7030A0"/>
+                </a:solidFill>
+                <a:latin typeface="Comic Sans MS" panose="030F0702030302020204" pitchFamily="66" charset="0"/>
+              </a:rPr>
+              <a:t>Other’s choices.</a:t>
+            </a:r>
+          </a:p>
+          <a:p>
+            <a:pPr marL="685800" lvl="1" indent="-228600">
+              <a:buFont typeface="Arial" panose="020B0604020202020204" pitchFamily="34" charset="0"/>
+              <a:buChar char="•"/>
+            </a:pPr>
+            <a:r>
+              <a:rPr lang="en-US" sz="2400" dirty="0">
+                <a:solidFill>
+                  <a:srgbClr val="7030A0"/>
+                </a:solidFill>
+                <a:latin typeface="Comic Sans MS" panose="030F0702030302020204" pitchFamily="66" charset="0"/>
+              </a:rPr>
+              <a:t>Real-time discussion of choices. </a:t>
+            </a:r>
+            <a:endParaRPr lang="en-US" sz="3600" b="1" dirty="0">
               <a:solidFill>
-                <a:srgbClr val="0000FF"/>
+                <a:srgbClr val="7030A0"/>
               </a:solidFill>
               <a:latin typeface="Comic Sans MS" panose="030F0702030302020204" pitchFamily="66" charset="0"/>
             </a:endParaRPr>
           </a:p>
-          <a:p>
-            <a:pPr marL="2573338" indent="-171450">
-              <a:buFont typeface="Arial" panose="020B0604020202020204" pitchFamily="34" charset="0"/>
-              <a:buChar char="•"/>
-            </a:pPr>
-            <a:r>
-              <a:rPr lang="en-US" sz="2800" b="1" dirty="0">
-                <a:solidFill>
-                  <a:srgbClr val="00B050"/>
-                </a:solidFill>
-                <a:latin typeface="Comic Sans MS" panose="030F0702030302020204" pitchFamily="66" charset="0"/>
-              </a:rPr>
-              <a:t>Within one’s available water.</a:t>
-            </a:r>
-          </a:p>
-          <a:p>
-            <a:pPr marL="2573338" indent="-171450">
-              <a:buFont typeface="Arial" panose="020B0604020202020204" pitchFamily="34" charset="0"/>
-              <a:buChar char="•"/>
-            </a:pPr>
-            <a:r>
-              <a:rPr lang="en-US" sz="2800" b="1" dirty="0">
-                <a:solidFill>
-                  <a:srgbClr val="00B050"/>
-                </a:solidFill>
-                <a:latin typeface="Comic Sans MS" panose="030F0702030302020204" pitchFamily="66" charset="0"/>
-              </a:rPr>
-              <a:t>In response to others’ choices.</a:t>
-            </a:r>
-          </a:p>
-          <a:p>
-            <a:pPr marL="2573338" indent="-171450">
-              <a:buFont typeface="Arial" panose="020B0604020202020204" pitchFamily="34" charset="0"/>
-              <a:buChar char="•"/>
-            </a:pPr>
-            <a:r>
-              <a:rPr lang="en-US" sz="2800" b="1" dirty="0">
-                <a:solidFill>
-                  <a:srgbClr val="00B050"/>
-                </a:solidFill>
-                <a:latin typeface="Comic Sans MS" panose="030F0702030302020204" pitchFamily="66" charset="0"/>
-              </a:rPr>
-              <a:t>Real-time discussion of choices</a:t>
-            </a:r>
-          </a:p>
-          <a:p>
-            <a:pPr algn="ctr"/>
-            <a:endParaRPr lang="en-US" sz="3600" b="1" dirty="0">
-              <a:solidFill>
-                <a:srgbClr val="0000FF"/>
-              </a:solidFill>
-              <a:latin typeface="Comic Sans MS" panose="030F0702030302020204" pitchFamily="66" charset="0"/>
-            </a:endParaRPr>
-          </a:p>
         </p:txBody>
       </p:sp>
       <p:sp>
@@ -3769,7 +3790,7 @@
         </p:nvSpPr>
         <p:spPr>
           <a:xfrm>
-            <a:off x="1604682" y="4956433"/>
+            <a:off x="780646" y="4932983"/>
             <a:ext cx="2187388" cy="1200329"/>
           </a:xfrm>
           <a:prstGeom prst="rect">
@@ -3785,7 +3806,7 @@
           <a:p>
             <a:pPr algn="ctr"/>
             <a:r>
-              <a:rPr lang="en-US" sz="2400" dirty="0">
+              <a:rPr lang="en-US" sz="2400" b="1" dirty="0">
                 <a:solidFill>
                   <a:srgbClr val="FF0000"/>
                 </a:solidFill>
@@ -3810,8 +3831,8 @@
         </p:nvSpPr>
         <p:spPr>
           <a:xfrm>
-            <a:off x="4231341" y="4812998"/>
-            <a:ext cx="6355977" cy="1938992"/>
+            <a:off x="3500603" y="4825646"/>
+            <a:ext cx="7259363" cy="1569660"/>
           </a:xfrm>
           <a:prstGeom prst="rect">
             <a:avLst/>
@@ -3851,6 +3872,88 @@
                 <a:latin typeface="Comic Sans MS" panose="030F0702030302020204" pitchFamily="66" charset="0"/>
               </a:rPr>
               <a:t>Increase user autonomy to manage their conflicting vulnerabilities to water shortages.</a:t>
+            </a:r>
+          </a:p>
+        </p:txBody>
+      </p:sp>
+      <p:sp>
+        <p:nvSpPr>
+          <p:cNvPr id="2" name="TextBox 1">
+            <a:extLst>
+              <a:ext uri="{FF2B5EF4-FFF2-40B4-BE49-F238E27FC236}">
+                <a16:creationId xmlns:a16="http://schemas.microsoft.com/office/drawing/2014/main" id="{0F4982C3-5F14-3471-BA82-76F7F74B1E6C}"/>
+              </a:ext>
+            </a:extLst>
+          </p:cNvPr>
+          <p:cNvSpPr txBox="1"/>
+          <p:nvPr/>
+        </p:nvSpPr>
+        <p:spPr>
+          <a:xfrm>
+            <a:off x="780646" y="2421331"/>
+            <a:ext cx="2187388" cy="523220"/>
+          </a:xfrm>
+          <a:prstGeom prst="rect">
+            <a:avLst/>
+          </a:prstGeom>
+          <a:noFill/>
+        </p:spPr>
+        <p:txBody>
+          <a:bodyPr wrap="square">
+            <a:spAutoFit/>
+          </a:bodyPr>
+          <a:lstStyle/>
+          <a:p>
+            <a:pPr algn="ctr"/>
+            <a:r>
+              <a:rPr lang="en-US" sz="2800" b="1" dirty="0">
+                <a:solidFill>
+                  <a:srgbClr val="7030A0"/>
+                </a:solidFill>
+                <a:latin typeface="Comic Sans MS" panose="030F0702030302020204" pitchFamily="66" charset="0"/>
+              </a:rPr>
+              <a:t>Learn why:</a:t>
+            </a:r>
+          </a:p>
+        </p:txBody>
+      </p:sp>
+      <p:sp>
+        <p:nvSpPr>
+          <p:cNvPr id="8" name="TextBox 7">
+            <a:extLst>
+              <a:ext uri="{FF2B5EF4-FFF2-40B4-BE49-F238E27FC236}">
+                <a16:creationId xmlns:a16="http://schemas.microsoft.com/office/drawing/2014/main" id="{B32A1296-6307-6FF8-414F-885A2095FCB4}"/>
+              </a:ext>
+            </a:extLst>
+          </p:cNvPr>
+          <p:cNvSpPr txBox="1"/>
+          <p:nvPr/>
+        </p:nvSpPr>
+        <p:spPr>
+          <a:xfrm>
+            <a:off x="3497975" y="701238"/>
+            <a:ext cx="7593066" cy="1384995"/>
+          </a:xfrm>
+          <a:prstGeom prst="rect">
+            <a:avLst/>
+          </a:prstGeom>
+          <a:noFill/>
+        </p:spPr>
+        <p:txBody>
+          <a:bodyPr wrap="square">
+            <a:spAutoFit/>
+          </a:bodyPr>
+          <a:lstStyle/>
+          <a:p>
+            <a:pPr algn="ctr"/>
+            <a:r>
+              <a:rPr lang="en-US" sz="2800" b="1" dirty="0">
+                <a:solidFill>
+                  <a:srgbClr val="0000FF"/>
+                </a:solidFill>
+                <a:latin typeface="Comic Sans MS" panose="030F0702030302020204" pitchFamily="66" charset="0"/>
+              </a:rPr>
+              <a:t>Immerse in and personify water user roles for a Lake Mead model based on the principle of divide reservoir inflow</a:t>
             </a:r>
           </a:p>
         </p:txBody>
@@ -5890,10 +5993,10 @@
         </p:nvGrpSpPr>
         <p:grpSpPr>
           <a:xfrm>
-            <a:off x="314502" y="3037185"/>
-            <a:ext cx="11562995" cy="2029105"/>
-            <a:chOff x="285744" y="2823186"/>
-            <a:chExt cx="11562995" cy="2029105"/>
+            <a:off x="314502" y="2950473"/>
+            <a:ext cx="11562995" cy="2131583"/>
+            <a:chOff x="285744" y="2720708"/>
+            <a:chExt cx="11562995" cy="2131583"/>
           </a:xfrm>
         </p:grpSpPr>
         <p:sp>
@@ -5990,8 +6093,8 @@
           </p:nvSpPr>
           <p:spPr>
             <a:xfrm>
-              <a:off x="2343723" y="3006618"/>
-              <a:ext cx="1647646" cy="954107"/>
+              <a:off x="2343723" y="2872609"/>
+              <a:ext cx="1647646" cy="1384995"/>
             </a:xfrm>
             <a:prstGeom prst="rect">
               <a:avLst/>
@@ -6007,7 +6110,7 @@
               <a:pPr algn="ctr"/>
               <a:r>
                 <a:rPr lang="en-US" sz="2800" dirty="0"/>
-                <a:t>Account Balance</a:t>
+                <a:t>Prior Available Water</a:t>
               </a:r>
             </a:p>
           </p:txBody>
@@ -6062,7 +6165,7 @@
           </p:nvSpPr>
           <p:spPr>
             <a:xfrm>
-              <a:off x="4401702" y="2823186"/>
+              <a:off x="4401702" y="2720708"/>
               <a:ext cx="1435941" cy="1815882"/>
             </a:xfrm>
             <a:prstGeom prst="rect">
@@ -6467,7 +6570,7 @@
         </p:nvSpPr>
         <p:spPr>
           <a:xfrm>
-            <a:off x="6315959" y="2814919"/>
+            <a:off x="6315959" y="2791270"/>
             <a:ext cx="3157979" cy="2671482"/>
           </a:xfrm>
           <a:prstGeom prst="rect">
@@ -6520,7 +6623,7 @@
         </p:nvSpPr>
         <p:spPr>
           <a:xfrm>
-            <a:off x="2300140" y="2814919"/>
+            <a:off x="2300140" y="2791270"/>
             <a:ext cx="4015819" cy="2671482"/>
           </a:xfrm>
           <a:prstGeom prst="rect">
@@ -6573,7 +6676,7 @@
         </p:nvSpPr>
         <p:spPr>
           <a:xfrm>
-            <a:off x="539112" y="832965"/>
+            <a:off x="539112" y="809316"/>
             <a:ext cx="10843591" cy="1077218"/>
           </a:xfrm>
           <a:prstGeom prst="rect">
@@ -6614,7 +6717,7 @@
         </p:nvSpPr>
         <p:spPr>
           <a:xfrm>
-            <a:off x="2598008" y="3291887"/>
+            <a:off x="2598008" y="3268238"/>
             <a:ext cx="1842017" cy="584775"/>
           </a:xfrm>
           <a:prstGeom prst="rect">
@@ -6653,7 +6756,7 @@
         </p:nvSpPr>
         <p:spPr>
           <a:xfrm>
-            <a:off x="7763897" y="3291887"/>
+            <a:off x="7763897" y="3268238"/>
             <a:ext cx="1534840" cy="584775"/>
           </a:xfrm>
           <a:prstGeom prst="rect">
@@ -6694,7 +6797,7 @@
         </p:nvSpPr>
         <p:spPr>
           <a:xfrm>
-            <a:off x="5288438" y="2814919"/>
+            <a:off x="5288438" y="2791270"/>
             <a:ext cx="2300258" cy="2671482"/>
           </a:xfrm>
           <a:prstGeom prst="rect">
@@ -6751,7 +6854,7 @@
         </p:nvSpPr>
         <p:spPr>
           <a:xfrm>
-            <a:off x="5765413" y="3291887"/>
+            <a:off x="5765413" y="3268238"/>
             <a:ext cx="1534840" cy="584775"/>
           </a:xfrm>
           <a:prstGeom prst="rect">
@@ -6793,7 +6896,7 @@
         </p:nvSpPr>
         <p:spPr>
           <a:xfrm>
-            <a:off x="5227340" y="4022872"/>
+            <a:off x="5227340" y="3999223"/>
             <a:ext cx="1211227" cy="523220"/>
           </a:xfrm>
           <a:prstGeom prst="rect">
@@ -6833,7 +6936,7 @@
         </p:nvSpPr>
         <p:spPr>
           <a:xfrm>
-            <a:off x="6365568" y="4430692"/>
+            <a:off x="6365568" y="4407043"/>
             <a:ext cx="1211227" cy="523220"/>
           </a:xfrm>
           <a:prstGeom prst="rect">
@@ -6875,7 +6978,7 @@
         </p:nvSpPr>
         <p:spPr>
           <a:xfrm>
-            <a:off x="4635860" y="5748042"/>
+            <a:off x="4635860" y="5724393"/>
             <a:ext cx="3056411" cy="584775"/>
           </a:xfrm>
           <a:prstGeom prst="rect">

</xml_diff>

<commit_message>
Anabelle updated old figures.
</commit_message>
<xml_diff>
--- a/LakeMeadWaterBankDivideInflow/ImmersiveModelLakeMeadDivideInflow-LetsStart.pptx
+++ b/LakeMeadWaterBankDivideInflow/ImmersiveModelLakeMeadDivideInflow-LetsStart.pptx
@@ -264,7 +264,7 @@
           <a:p>
             <a:fld id="{80695A85-0000-41C1-B1AB-596518EE5666}" type="datetimeFigureOut">
               <a:rPr lang="en-US" smtClean="0"/>
-              <a:t>1/24/2025</a:t>
+              <a:t>6/25/25</a:t>
             </a:fld>
             <a:endParaRPr lang="en-US"/>
           </a:p>
@@ -462,7 +462,7 @@
           <a:p>
             <a:fld id="{80695A85-0000-41C1-B1AB-596518EE5666}" type="datetimeFigureOut">
               <a:rPr lang="en-US" smtClean="0"/>
-              <a:t>1/24/2025</a:t>
+              <a:t>6/25/25</a:t>
             </a:fld>
             <a:endParaRPr lang="en-US"/>
           </a:p>
@@ -670,7 +670,7 @@
           <a:p>
             <a:fld id="{80695A85-0000-41C1-B1AB-596518EE5666}" type="datetimeFigureOut">
               <a:rPr lang="en-US" smtClean="0"/>
-              <a:t>1/24/2025</a:t>
+              <a:t>6/25/25</a:t>
             </a:fld>
             <a:endParaRPr lang="en-US"/>
           </a:p>
@@ -868,7 +868,7 @@
           <a:p>
             <a:fld id="{80695A85-0000-41C1-B1AB-596518EE5666}" type="datetimeFigureOut">
               <a:rPr lang="en-US" smtClean="0"/>
-              <a:t>1/24/2025</a:t>
+              <a:t>6/25/25</a:t>
             </a:fld>
             <a:endParaRPr lang="en-US"/>
           </a:p>
@@ -1143,7 +1143,7 @@
           <a:p>
             <a:fld id="{80695A85-0000-41C1-B1AB-596518EE5666}" type="datetimeFigureOut">
               <a:rPr lang="en-US" smtClean="0"/>
-              <a:t>1/24/2025</a:t>
+              <a:t>6/25/25</a:t>
             </a:fld>
             <a:endParaRPr lang="en-US"/>
           </a:p>
@@ -1408,7 +1408,7 @@
           <a:p>
             <a:fld id="{80695A85-0000-41C1-B1AB-596518EE5666}" type="datetimeFigureOut">
               <a:rPr lang="en-US" smtClean="0"/>
-              <a:t>1/24/2025</a:t>
+              <a:t>6/25/25</a:t>
             </a:fld>
             <a:endParaRPr lang="en-US"/>
           </a:p>
@@ -1820,7 +1820,7 @@
           <a:p>
             <a:fld id="{80695A85-0000-41C1-B1AB-596518EE5666}" type="datetimeFigureOut">
               <a:rPr lang="en-US" smtClean="0"/>
-              <a:t>1/24/2025</a:t>
+              <a:t>6/25/25</a:t>
             </a:fld>
             <a:endParaRPr lang="en-US"/>
           </a:p>
@@ -1961,7 +1961,7 @@
           <a:p>
             <a:fld id="{80695A85-0000-41C1-B1AB-596518EE5666}" type="datetimeFigureOut">
               <a:rPr lang="en-US" smtClean="0"/>
-              <a:t>1/24/2025</a:t>
+              <a:t>6/25/25</a:t>
             </a:fld>
             <a:endParaRPr lang="en-US"/>
           </a:p>
@@ -2074,7 +2074,7 @@
           <a:p>
             <a:fld id="{80695A85-0000-41C1-B1AB-596518EE5666}" type="datetimeFigureOut">
               <a:rPr lang="en-US" smtClean="0"/>
-              <a:t>1/24/2025</a:t>
+              <a:t>6/25/25</a:t>
             </a:fld>
             <a:endParaRPr lang="en-US"/>
           </a:p>
@@ -2385,7 +2385,7 @@
           <a:p>
             <a:fld id="{80695A85-0000-41C1-B1AB-596518EE5666}" type="datetimeFigureOut">
               <a:rPr lang="en-US" smtClean="0"/>
-              <a:t>1/24/2025</a:t>
+              <a:t>6/25/25</a:t>
             </a:fld>
             <a:endParaRPr lang="en-US"/>
           </a:p>
@@ -2673,7 +2673,7 @@
           <a:p>
             <a:fld id="{80695A85-0000-41C1-B1AB-596518EE5666}" type="datetimeFigureOut">
               <a:rPr lang="en-US" smtClean="0"/>
-              <a:t>1/24/2025</a:t>
+              <a:t>6/25/25</a:t>
             </a:fld>
             <a:endParaRPr lang="en-US"/>
           </a:p>
@@ -2914,7 +2914,7 @@
           <a:p>
             <a:fld id="{80695A85-0000-41C1-B1AB-596518EE5666}" type="datetimeFigureOut">
               <a:rPr lang="en-US" smtClean="0"/>
-              <a:t>1/24/2025</a:t>
+              <a:t>6/25/25</a:t>
             </a:fld>
             <a:endParaRPr lang="en-US"/>
           </a:p>
@@ -3634,8 +3634,8 @@
         </p:nvSpPr>
         <p:spPr>
           <a:xfrm>
-            <a:off x="696976" y="421523"/>
-            <a:ext cx="2259058" cy="1325563"/>
+            <a:off x="629392" y="421523"/>
+            <a:ext cx="2326642" cy="1325563"/>
           </a:xfrm>
         </p:spPr>
         <p:txBody>
@@ -6558,112 +6558,6 @@
       </p:grpSpPr>
       <p:sp>
         <p:nvSpPr>
-          <p:cNvPr id="25" name="Rectangle 24">
-            <a:extLst>
-              <a:ext uri="{FF2B5EF4-FFF2-40B4-BE49-F238E27FC236}">
-                <a16:creationId xmlns:a16="http://schemas.microsoft.com/office/drawing/2014/main" id="{CEE6A100-6190-03C1-4AC1-ED5A1D140247}"/>
-              </a:ext>
-            </a:extLst>
-          </p:cNvPr>
-          <p:cNvSpPr/>
-          <p:nvPr/>
-        </p:nvSpPr>
-        <p:spPr>
-          <a:xfrm>
-            <a:off x="6315959" y="2791270"/>
-            <a:ext cx="3157979" cy="2671482"/>
-          </a:xfrm>
-          <a:prstGeom prst="rect">
-            <a:avLst/>
-          </a:prstGeom>
-          <a:solidFill>
-            <a:schemeClr val="accent2">
-              <a:lumMod val="20000"/>
-              <a:lumOff val="80000"/>
-            </a:schemeClr>
-          </a:solidFill>
-          <a:ln w="22225"/>
-        </p:spPr>
-        <p:style>
-          <a:lnRef idx="2">
-            <a:schemeClr val="accent1">
-              <a:shade val="15000"/>
-            </a:schemeClr>
-          </a:lnRef>
-          <a:fillRef idx="1">
-            <a:schemeClr val="accent1"/>
-          </a:fillRef>
-          <a:effectRef idx="0">
-            <a:schemeClr val="accent1"/>
-          </a:effectRef>
-          <a:fontRef idx="minor">
-            <a:schemeClr val="lt1"/>
-          </a:fontRef>
-        </p:style>
-        <p:txBody>
-          <a:bodyPr rtlCol="0" anchor="ctr"/>
-          <a:lstStyle/>
-          <a:p>
-            <a:pPr algn="ctr"/>
-            <a:endParaRPr lang="en-US"/>
-          </a:p>
-        </p:txBody>
-      </p:sp>
-      <p:sp>
-        <p:nvSpPr>
-          <p:cNvPr id="24" name="Rectangle 23">
-            <a:extLst>
-              <a:ext uri="{FF2B5EF4-FFF2-40B4-BE49-F238E27FC236}">
-                <a16:creationId xmlns:a16="http://schemas.microsoft.com/office/drawing/2014/main" id="{B81EF1D2-DBA4-B3E4-9395-7DF576A60114}"/>
-              </a:ext>
-            </a:extLst>
-          </p:cNvPr>
-          <p:cNvSpPr/>
-          <p:nvPr/>
-        </p:nvSpPr>
-        <p:spPr>
-          <a:xfrm>
-            <a:off x="2300140" y="2791270"/>
-            <a:ext cx="4015819" cy="2671482"/>
-          </a:xfrm>
-          <a:prstGeom prst="rect">
-            <a:avLst/>
-          </a:prstGeom>
-          <a:solidFill>
-            <a:schemeClr val="accent1">
-              <a:lumMod val="20000"/>
-              <a:lumOff val="80000"/>
-            </a:schemeClr>
-          </a:solidFill>
-          <a:ln w="22225"/>
-        </p:spPr>
-        <p:style>
-          <a:lnRef idx="2">
-            <a:schemeClr val="accent1">
-              <a:shade val="15000"/>
-            </a:schemeClr>
-          </a:lnRef>
-          <a:fillRef idx="1">
-            <a:schemeClr val="accent1"/>
-          </a:fillRef>
-          <a:effectRef idx="0">
-            <a:schemeClr val="accent1"/>
-          </a:effectRef>
-          <a:fontRef idx="minor">
-            <a:schemeClr val="lt1"/>
-          </a:fontRef>
-        </p:style>
-        <p:txBody>
-          <a:bodyPr rtlCol="0" anchor="ctr"/>
-          <a:lstStyle/>
-          <a:p>
-            <a:pPr algn="ctr"/>
-            <a:endParaRPr lang="en-US"/>
-          </a:p>
-        </p:txBody>
-      </p:sp>
-      <p:sp>
-        <p:nvSpPr>
           <p:cNvPr id="13" name="TextBox 12">
             <a:extLst>
               <a:ext uri="{FF2B5EF4-FFF2-40B4-BE49-F238E27FC236}">
@@ -6703,302 +6597,47 @@
           </a:p>
         </p:txBody>
       </p:sp>
-      <p:sp>
-        <p:nvSpPr>
-          <p:cNvPr id="20" name="TextBox 19">
-            <a:extLst>
-              <a:ext uri="{FF2B5EF4-FFF2-40B4-BE49-F238E27FC236}">
-                <a16:creationId xmlns:a16="http://schemas.microsoft.com/office/drawing/2014/main" id="{D1731D7D-3F58-FB5A-91C0-3A25921955CC}"/>
-              </a:ext>
-            </a:extLst>
-          </p:cNvPr>
-          <p:cNvSpPr txBox="1"/>
+      <p:pic>
+        <p:nvPicPr>
+          <p:cNvPr id="3" name="Picture 2" descr="A pie chart with numbers and a number of states&#10;&#10;AI-generated content may be incorrect.">
+            <a:extLst>
+              <a:ext uri="{FF2B5EF4-FFF2-40B4-BE49-F238E27FC236}">
+                <a16:creationId xmlns:a16="http://schemas.microsoft.com/office/drawing/2014/main" id="{094398E3-B68C-B94C-64E6-6845791055A1}"/>
+              </a:ext>
+            </a:extLst>
+          </p:cNvPr>
+          <p:cNvPicPr>
+            <a:picLocks noChangeAspect="1"/>
+          </p:cNvPicPr>
           <p:nvPr/>
-        </p:nvSpPr>
+        </p:nvPicPr>
+        <p:blipFill>
+          <a:blip r:embed="rId2">
+            <a:extLst>
+              <a:ext uri="{28A0092B-C50C-407E-A947-70E740481C1C}">
+                <a14:useLocalDpi xmlns:a14="http://schemas.microsoft.com/office/drawing/2010/main" val="0"/>
+              </a:ext>
+            </a:extLst>
+          </a:blip>
+          <a:stretch>
+            <a:fillRect/>
+          </a:stretch>
+        </p:blipFill>
         <p:spPr>
           <a:xfrm>
-            <a:off x="2598008" y="3268238"/>
-            <a:ext cx="1842017" cy="584775"/>
+            <a:off x="3465512" y="1981537"/>
+            <a:ext cx="5260975" cy="4463315"/>
           </a:xfrm>
           <a:prstGeom prst="rect">
             <a:avLst/>
           </a:prstGeom>
-          <a:noFill/>
+          <a:ln>
+            <a:solidFill>
+              <a:schemeClr val="tx1"/>
+            </a:solidFill>
+          </a:ln>
         </p:spPr>
-        <p:txBody>
-          <a:bodyPr wrap="square" rtlCol="0">
-            <a:spAutoFit/>
-          </a:bodyPr>
-          <a:lstStyle/>
-          <a:p>
-            <a:r>
-              <a:rPr lang="en-US" sz="3200" b="1" dirty="0">
-                <a:solidFill>
-                  <a:srgbClr val="0000FF"/>
-                </a:solidFill>
-              </a:rPr>
-              <a:t>California</a:t>
-            </a:r>
-          </a:p>
-        </p:txBody>
-      </p:sp>
-      <p:sp>
-        <p:nvSpPr>
-          <p:cNvPr id="21" name="TextBox 20">
-            <a:extLst>
-              <a:ext uri="{FF2B5EF4-FFF2-40B4-BE49-F238E27FC236}">
-                <a16:creationId xmlns:a16="http://schemas.microsoft.com/office/drawing/2014/main" id="{37E74C97-F985-342E-0F88-4241D9663912}"/>
-              </a:ext>
-            </a:extLst>
-          </p:cNvPr>
-          <p:cNvSpPr txBox="1"/>
-          <p:nvPr/>
-        </p:nvSpPr>
-        <p:spPr>
-          <a:xfrm>
-            <a:off x="7763897" y="3268238"/>
-            <a:ext cx="1534840" cy="584775"/>
-          </a:xfrm>
-          <a:prstGeom prst="rect">
-            <a:avLst/>
-          </a:prstGeom>
-          <a:noFill/>
-        </p:spPr>
-        <p:txBody>
-          <a:bodyPr wrap="square" rtlCol="0">
-            <a:spAutoFit/>
-          </a:bodyPr>
-          <a:lstStyle/>
-          <a:p>
-            <a:r>
-              <a:rPr lang="en-US" sz="3200" b="1" dirty="0">
-                <a:solidFill>
-                  <a:schemeClr val="accent2">
-                    <a:lumMod val="50000"/>
-                  </a:schemeClr>
-                </a:solidFill>
-              </a:rPr>
-              <a:t>Arizona</a:t>
-            </a:r>
-          </a:p>
-        </p:txBody>
-      </p:sp>
-      <p:sp>
-        <p:nvSpPr>
-          <p:cNvPr id="26" name="Rectangle 25">
-            <a:extLst>
-              <a:ext uri="{FF2B5EF4-FFF2-40B4-BE49-F238E27FC236}">
-                <a16:creationId xmlns:a16="http://schemas.microsoft.com/office/drawing/2014/main" id="{CD895DFA-21C6-0996-5163-636CFEE077FB}"/>
-              </a:ext>
-            </a:extLst>
-          </p:cNvPr>
-          <p:cNvSpPr/>
-          <p:nvPr/>
-        </p:nvSpPr>
-        <p:spPr>
-          <a:xfrm>
-            <a:off x="5288438" y="2791270"/>
-            <a:ext cx="2300258" cy="2671482"/>
-          </a:xfrm>
-          <a:prstGeom prst="rect">
-            <a:avLst/>
-          </a:prstGeom>
-          <a:solidFill>
-            <a:schemeClr val="accent4">
-              <a:lumMod val="20000"/>
-              <a:lumOff val="80000"/>
-              <a:alpha val="71000"/>
-            </a:schemeClr>
-          </a:solidFill>
-        </p:spPr>
-        <p:style>
-          <a:lnRef idx="2">
-            <a:schemeClr val="accent1">
-              <a:shade val="15000"/>
-            </a:schemeClr>
-          </a:lnRef>
-          <a:fillRef idx="1">
-            <a:schemeClr val="accent1"/>
-          </a:fillRef>
-          <a:effectRef idx="0">
-            <a:schemeClr val="accent1"/>
-          </a:effectRef>
-          <a:fontRef idx="minor">
-            <a:schemeClr val="lt1"/>
-          </a:fontRef>
-        </p:style>
-        <p:txBody>
-          <a:bodyPr rtlCol="0" anchor="ctr"/>
-          <a:lstStyle/>
-          <a:p>
-            <a:pPr algn="ctr"/>
-            <a:endParaRPr lang="en-US">
-              <a:solidFill>
-                <a:srgbClr val="0000FF"/>
-              </a:solidFill>
-            </a:endParaRPr>
-          </a:p>
-        </p:txBody>
-      </p:sp>
-      <p:sp>
-        <p:nvSpPr>
-          <p:cNvPr id="27" name="TextBox 26">
-            <a:extLst>
-              <a:ext uri="{FF2B5EF4-FFF2-40B4-BE49-F238E27FC236}">
-                <a16:creationId xmlns:a16="http://schemas.microsoft.com/office/drawing/2014/main" id="{6092F63F-61AC-3030-4A78-66D8F79A14A3}"/>
-              </a:ext>
-            </a:extLst>
-          </p:cNvPr>
-          <p:cNvSpPr txBox="1"/>
-          <p:nvPr/>
-        </p:nvSpPr>
-        <p:spPr>
-          <a:xfrm>
-            <a:off x="5765413" y="3268238"/>
-            <a:ext cx="1534840" cy="584775"/>
-          </a:xfrm>
-          <a:prstGeom prst="rect">
-            <a:avLst/>
-          </a:prstGeom>
-          <a:noFill/>
-        </p:spPr>
-        <p:txBody>
-          <a:bodyPr wrap="square" rtlCol="0">
-            <a:spAutoFit/>
-          </a:bodyPr>
-          <a:lstStyle/>
-          <a:p>
-            <a:pPr algn="ctr"/>
-            <a:r>
-              <a:rPr lang="en-US" sz="3200" b="1" dirty="0">
-                <a:solidFill>
-                  <a:schemeClr val="accent6">
-                    <a:lumMod val="50000"/>
-                  </a:schemeClr>
-                </a:solidFill>
-              </a:rPr>
-              <a:t>Tribal</a:t>
-            </a:r>
-          </a:p>
-        </p:txBody>
-      </p:sp>
-      <p:sp>
-        <p:nvSpPr>
-          <p:cNvPr id="23" name="TextBox 22">
-            <a:extLst>
-              <a:ext uri="{FF2B5EF4-FFF2-40B4-BE49-F238E27FC236}">
-                <a16:creationId xmlns:a16="http://schemas.microsoft.com/office/drawing/2014/main" id="{EBC00D3C-316D-7ED3-E867-882F5AAB14A1}"/>
-              </a:ext>
-            </a:extLst>
-          </p:cNvPr>
-          <p:cNvSpPr txBox="1"/>
-          <p:nvPr/>
-        </p:nvSpPr>
-        <p:spPr>
-          <a:xfrm>
-            <a:off x="5227340" y="3999223"/>
-            <a:ext cx="1211227" cy="523220"/>
-          </a:xfrm>
-          <a:prstGeom prst="rect">
-            <a:avLst/>
-          </a:prstGeom>
-          <a:noFill/>
-        </p:spPr>
-        <p:txBody>
-          <a:bodyPr wrap="square" rtlCol="0">
-            <a:spAutoFit/>
-          </a:bodyPr>
-          <a:lstStyle/>
-          <a:p>
-            <a:pPr algn="ctr"/>
-            <a:r>
-              <a:rPr lang="en-US" sz="2800" b="1" dirty="0">
-                <a:solidFill>
-                  <a:srgbClr val="0000FF"/>
-                </a:solidFill>
-              </a:rPr>
-              <a:t>16.4%</a:t>
-            </a:r>
-          </a:p>
-        </p:txBody>
-      </p:sp>
-      <p:sp>
-        <p:nvSpPr>
-          <p:cNvPr id="28" name="TextBox 27">
-            <a:extLst>
-              <a:ext uri="{FF2B5EF4-FFF2-40B4-BE49-F238E27FC236}">
-                <a16:creationId xmlns:a16="http://schemas.microsoft.com/office/drawing/2014/main" id="{70B59576-EE7F-DEC7-68DD-9E116EBE5C35}"/>
-              </a:ext>
-            </a:extLst>
-          </p:cNvPr>
-          <p:cNvSpPr txBox="1"/>
-          <p:nvPr/>
-        </p:nvSpPr>
-        <p:spPr>
-          <a:xfrm>
-            <a:off x="6365568" y="4407043"/>
-            <a:ext cx="1211227" cy="523220"/>
-          </a:xfrm>
-          <a:prstGeom prst="rect">
-            <a:avLst/>
-          </a:prstGeom>
-          <a:noFill/>
-        </p:spPr>
-        <p:txBody>
-          <a:bodyPr wrap="square" rtlCol="0">
-            <a:spAutoFit/>
-          </a:bodyPr>
-          <a:lstStyle/>
-          <a:p>
-            <a:pPr algn="ctr"/>
-            <a:r>
-              <a:rPr lang="en-US" sz="2800" b="1" dirty="0">
-                <a:solidFill>
-                  <a:schemeClr val="accent2">
-                    <a:lumMod val="50000"/>
-                  </a:schemeClr>
-                </a:solidFill>
-              </a:rPr>
-              <a:t>82.4%</a:t>
-            </a:r>
-          </a:p>
-        </p:txBody>
-      </p:sp>
-      <p:sp>
-        <p:nvSpPr>
-          <p:cNvPr id="29" name="TextBox 28">
-            <a:extLst>
-              <a:ext uri="{FF2B5EF4-FFF2-40B4-BE49-F238E27FC236}">
-                <a16:creationId xmlns:a16="http://schemas.microsoft.com/office/drawing/2014/main" id="{BB28218A-51FE-9E67-6B62-54D8E034A52D}"/>
-              </a:ext>
-            </a:extLst>
-          </p:cNvPr>
-          <p:cNvSpPr txBox="1"/>
-          <p:nvPr/>
-        </p:nvSpPr>
-        <p:spPr>
-          <a:xfrm>
-            <a:off x="4635860" y="5724393"/>
-            <a:ext cx="3056411" cy="584775"/>
-          </a:xfrm>
-          <a:prstGeom prst="rect">
-            <a:avLst/>
-          </a:prstGeom>
-          <a:noFill/>
-        </p:spPr>
-        <p:txBody>
-          <a:bodyPr wrap="square" rtlCol="0">
-            <a:spAutoFit/>
-          </a:bodyPr>
-          <a:lstStyle/>
-          <a:p>
-            <a:r>
-              <a:rPr lang="en-US" sz="3200" b="1" dirty="0"/>
-              <a:t>(Ignore Nevada)</a:t>
-            </a:r>
-          </a:p>
-        </p:txBody>
-      </p:sp>
+      </p:pic>
     </p:spTree>
     <p:extLst>
       <p:ext uri="{BB962C8B-B14F-4D97-AF65-F5344CB8AC3E}">

</xml_diff>